<commit_message>
Deploying to gh-pages from @ nlmixr2/monolix2rx@1e877df8f8c926f29b42ebd8b9987a3ba8b09d24 🚀
</commit_message>
<xml_diff>
--- a/articles/mod-PowerPoint.pptx
+++ b/articles/mod-PowerPoint.pptx
@@ -5472,6 +5472,17 @@
                         </a:spcAft>
                         <a:buNone/>
                       </a:pPr>
+                      <a:endParaRPr cap="none" sz="1100" i="0" b="0" u="none">
+                        <a:solidFill>
+                          <a:srgbClr val="000000">
+                            <a:alpha val="100000"/>
+                          </a:srgbClr>
+                        </a:solidFill>
+                        <a:latin typeface="DejaVu Sans"/>
+                        <a:cs typeface="DejaVu Sans"/>
+                        <a:ea typeface="DejaVu Sans"/>
+                        <a:sym typeface="DejaVu Sans"/>
+                      </a:endParaRPr>
                       <a:r>
                         <a:rPr cap="none" sz="1100" i="0" b="0" u="none">
                           <a:solidFill>
@@ -5529,6 +5540,17 @@
                         </a:spcAft>
                         <a:buNone/>
                       </a:pPr>
+                      <a:endParaRPr cap="none" sz="1100" i="0" b="0" u="none">
+                        <a:solidFill>
+                          <a:srgbClr val="000000">
+                            <a:alpha val="100000"/>
+                          </a:srgbClr>
+                        </a:solidFill>
+                        <a:latin typeface="DejaVu Sans"/>
+                        <a:cs typeface="DejaVu Sans"/>
+                        <a:ea typeface="DejaVu Sans"/>
+                        <a:sym typeface="DejaVu Sans"/>
+                      </a:endParaRPr>
                       <a:r>
                         <a:rPr cap="none" sz="1100" i="0" b="0" u="none">
                           <a:solidFill>
@@ -5881,6 +5903,17 @@
                         </a:spcAft>
                         <a:buNone/>
                       </a:pPr>
+                      <a:endParaRPr cap="none" sz="1100" i="0" b="0" u="none">
+                        <a:solidFill>
+                          <a:srgbClr val="000000">
+                            <a:alpha val="100000"/>
+                          </a:srgbClr>
+                        </a:solidFill>
+                        <a:latin typeface="DejaVu Sans"/>
+                        <a:cs typeface="DejaVu Sans"/>
+                        <a:ea typeface="DejaVu Sans"/>
+                        <a:sym typeface="DejaVu Sans"/>
+                      </a:endParaRPr>
                       <a:r>
                         <a:rPr cap="none" sz="1100" i="0" b="0" u="none">
                           <a:solidFill>
@@ -5942,6 +5975,17 @@
                         </a:spcAft>
                         <a:buNone/>
                       </a:pPr>
+                      <a:endParaRPr cap="none" sz="1100" i="0" b="0" u="none">
+                        <a:solidFill>
+                          <a:srgbClr val="000000">
+                            <a:alpha val="100000"/>
+                          </a:srgbClr>
+                        </a:solidFill>
+                        <a:latin typeface="DejaVu Sans"/>
+                        <a:cs typeface="DejaVu Sans"/>
+                        <a:ea typeface="DejaVu Sans"/>
+                        <a:sym typeface="DejaVu Sans"/>
+                      </a:endParaRPr>
                       <a:r>
                         <a:rPr cap="none" sz="1100" i="0" b="0" u="none">
                           <a:solidFill>

</xml_diff>

<commit_message>
Deploying to gh-pages from @ nlmixr2/monolix2rx@cfe62e72def8cbae23ddc1b4e086e1f1d1191a48 🚀
</commit_message>
<xml_diff>
--- a/articles/mod-PowerPoint.pptx
+++ b/articles/mod-PowerPoint.pptx
@@ -6281,7 +6281,7 @@
           </p:nvPr>
         </p:nvPicPr>
         <p:blipFill>
-          <a:blip cstate="print" r:embed="rId2"/>
+          <a:blip r:embed="rId2"/>
           <a:stretch>
             <a:fillRect/>
           </a:stretch>
@@ -6359,7 +6359,7 @@
           </p:nvPr>
         </p:nvPicPr>
         <p:blipFill>
-          <a:blip cstate="print" r:embed="rId2"/>
+          <a:blip r:embed="rId2"/>
           <a:stretch>
             <a:fillRect/>
           </a:stretch>
@@ -6437,7 +6437,7 @@
           </p:nvPr>
         </p:nvPicPr>
         <p:blipFill>
-          <a:blip cstate="print" r:embed="rId2"/>
+          <a:blip r:embed="rId2"/>
           <a:stretch>
             <a:fillRect/>
           </a:stretch>

</xml_diff>